<commit_message>
Feature/passenger information equipments and organisation (#19)
* adds passengerInformationEquipment for type trainDestinationDisplay

* removes duplicated of xml namespace

* Lint and update documentation tables

* fixes ordering of xml tags

* Lint and update documentation tables

* adds dsa on quay

* Lint and update documentation tables

* adds audio information system

* Lint and update documentation tables

* adds departure boards

* Lint and update documentation tables

* adds db information as passengerInformationEquipment

* Lint and update documentation tables

* feat: add Organisation and OrganisationPart

* Lint and update documentation tables

* feat: add audioForHearingImpaired

---------

Co-authored-by: David Will <david.will@deutschebahn.com>
Co-authored-by: github-actions <41898282+github-actions[bot]@users.noreply.github.com>
</commit_message>
<xml_diff>
--- a/examples/standards/tsi_prm/Musterhausen_Lageplan.pptx
+++ b/examples/standards/tsi_prm/Musterhausen_Lageplan.pptx
@@ -260,7 +260,7 @@
           <a:p>
             <a:fld id="{F8C7142F-C67B-604E-8FB9-0731CA897E51}" type="datetimeFigureOut">
               <a:rPr lang="de-DE" smtClean="0"/>
-              <a:t>28.11.23</a:t>
+              <a:t>18.12.23</a:t>
             </a:fld>
             <a:endParaRPr lang="de-DE"/>
           </a:p>
@@ -458,7 +458,7 @@
           <a:p>
             <a:fld id="{F8C7142F-C67B-604E-8FB9-0731CA897E51}" type="datetimeFigureOut">
               <a:rPr lang="de-DE" smtClean="0"/>
-              <a:t>28.11.23</a:t>
+              <a:t>18.12.23</a:t>
             </a:fld>
             <a:endParaRPr lang="de-DE"/>
           </a:p>
@@ -666,7 +666,7 @@
           <a:p>
             <a:fld id="{F8C7142F-C67B-604E-8FB9-0731CA897E51}" type="datetimeFigureOut">
               <a:rPr lang="de-DE" smtClean="0"/>
-              <a:t>28.11.23</a:t>
+              <a:t>18.12.23</a:t>
             </a:fld>
             <a:endParaRPr lang="de-DE"/>
           </a:p>
@@ -864,7 +864,7 @@
           <a:p>
             <a:fld id="{F8C7142F-C67B-604E-8FB9-0731CA897E51}" type="datetimeFigureOut">
               <a:rPr lang="de-DE" smtClean="0"/>
-              <a:t>28.11.23</a:t>
+              <a:t>18.12.23</a:t>
             </a:fld>
             <a:endParaRPr lang="de-DE"/>
           </a:p>
@@ -1139,7 +1139,7 @@
           <a:p>
             <a:fld id="{F8C7142F-C67B-604E-8FB9-0731CA897E51}" type="datetimeFigureOut">
               <a:rPr lang="de-DE" smtClean="0"/>
-              <a:t>28.11.23</a:t>
+              <a:t>18.12.23</a:t>
             </a:fld>
             <a:endParaRPr lang="de-DE"/>
           </a:p>
@@ -1404,7 +1404,7 @@
           <a:p>
             <a:fld id="{F8C7142F-C67B-604E-8FB9-0731CA897E51}" type="datetimeFigureOut">
               <a:rPr lang="de-DE" smtClean="0"/>
-              <a:t>28.11.23</a:t>
+              <a:t>18.12.23</a:t>
             </a:fld>
             <a:endParaRPr lang="de-DE"/>
           </a:p>
@@ -1816,7 +1816,7 @@
           <a:p>
             <a:fld id="{F8C7142F-C67B-604E-8FB9-0731CA897E51}" type="datetimeFigureOut">
               <a:rPr lang="de-DE" smtClean="0"/>
-              <a:t>28.11.23</a:t>
+              <a:t>18.12.23</a:t>
             </a:fld>
             <a:endParaRPr lang="de-DE"/>
           </a:p>
@@ -1957,7 +1957,7 @@
           <a:p>
             <a:fld id="{F8C7142F-C67B-604E-8FB9-0731CA897E51}" type="datetimeFigureOut">
               <a:rPr lang="de-DE" smtClean="0"/>
-              <a:t>28.11.23</a:t>
+              <a:t>18.12.23</a:t>
             </a:fld>
             <a:endParaRPr lang="de-DE"/>
           </a:p>
@@ -2070,7 +2070,7 @@
           <a:p>
             <a:fld id="{F8C7142F-C67B-604E-8FB9-0731CA897E51}" type="datetimeFigureOut">
               <a:rPr lang="de-DE" smtClean="0"/>
-              <a:t>28.11.23</a:t>
+              <a:t>18.12.23</a:t>
             </a:fld>
             <a:endParaRPr lang="de-DE"/>
           </a:p>
@@ -2381,7 +2381,7 @@
           <a:p>
             <a:fld id="{F8C7142F-C67B-604E-8FB9-0731CA897E51}" type="datetimeFigureOut">
               <a:rPr lang="de-DE" smtClean="0"/>
-              <a:t>28.11.23</a:t>
+              <a:t>18.12.23</a:t>
             </a:fld>
             <a:endParaRPr lang="de-DE"/>
           </a:p>
@@ -2669,7 +2669,7 @@
           <a:p>
             <a:fld id="{F8C7142F-C67B-604E-8FB9-0731CA897E51}" type="datetimeFigureOut">
               <a:rPr lang="de-DE" smtClean="0"/>
-              <a:t>28.11.23</a:t>
+              <a:t>18.12.23</a:t>
             </a:fld>
             <a:endParaRPr lang="de-DE"/>
           </a:p>
@@ -2910,7 +2910,7 @@
           <a:p>
             <a:fld id="{F8C7142F-C67B-604E-8FB9-0731CA897E51}" type="datetimeFigureOut">
               <a:rPr lang="de-DE" smtClean="0"/>
-              <a:t>28.11.23</a:t>
+              <a:t>18.12.23</a:t>
             </a:fld>
             <a:endParaRPr lang="de-DE"/>
           </a:p>
@@ -3336,7 +3336,9 @@
               </a:ext>
             </a:extLst>
           </p:cNvPr>
-          <p:cNvSpPr/>
+          <p:cNvSpPr>
+            <a:spLocks noGrp="1" noRot="1" noMove="1" noResize="1" noEditPoints="1" noAdjustHandles="1" noChangeArrowheads="1" noChangeShapeType="1"/>
+          </p:cNvSpPr>
           <p:nvPr/>
         </p:nvSpPr>
         <p:spPr>
@@ -3399,7 +3401,9 @@
               </a:ext>
             </a:extLst>
           </p:cNvPr>
-          <p:cNvGrpSpPr/>
+          <p:cNvGrpSpPr>
+            <a:grpSpLocks noGrp="1" noUngrp="1" noRot="1" noMove="1" noResize="1"/>
+          </p:cNvGrpSpPr>
           <p:nvPr/>
         </p:nvGrpSpPr>
         <p:grpSpPr>
@@ -3419,7 +3423,9 @@
                 </a:ext>
               </a:extLst>
             </p:cNvPr>
-            <p:cNvSpPr/>
+            <p:cNvSpPr>
+              <a:spLocks noGrp="1" noRot="1" noMove="1" noResize="1" noEditPoints="1" noAdjustHandles="1" noChangeArrowheads="1" noChangeShapeType="1"/>
+            </p:cNvSpPr>
             <p:nvPr/>
           </p:nvSpPr>
           <p:spPr>
@@ -3479,7 +3485,9 @@
                 </a:ext>
               </a:extLst>
             </p:cNvPr>
-            <p:cNvSpPr/>
+            <p:cNvSpPr>
+              <a:spLocks noGrp="1" noRot="1" noMove="1" noResize="1" noEditPoints="1" noAdjustHandles="1" noChangeArrowheads="1" noChangeShapeType="1"/>
+            </p:cNvSpPr>
             <p:nvPr/>
           </p:nvSpPr>
           <p:spPr>
@@ -3540,12 +3548,14 @@
               </a:ext>
             </a:extLst>
           </p:cNvPr>
-          <p:cNvSpPr/>
+          <p:cNvSpPr>
+            <a:spLocks noGrp="1" noRot="1" noMove="1" noResize="1" noEditPoints="1" noAdjustHandles="1" noChangeArrowheads="1" noChangeShapeType="1"/>
+          </p:cNvSpPr>
           <p:nvPr/>
         </p:nvSpPr>
         <p:spPr>
           <a:xfrm>
-            <a:off x="576563" y="2155470"/>
+            <a:off x="564002" y="2074565"/>
             <a:ext cx="1224951" cy="2510287"/>
           </a:xfrm>
           <a:prstGeom prst="rect">
@@ -3603,7 +3613,9 @@
               </a:ext>
             </a:extLst>
           </p:cNvPr>
-          <p:cNvSpPr/>
+          <p:cNvSpPr>
+            <a:spLocks noGrp="1" noRot="1" noMove="1" noResize="1" noEditPoints="1" noAdjustHandles="1" noChangeArrowheads="1" noChangeShapeType="1"/>
+          </p:cNvSpPr>
           <p:nvPr/>
         </p:nvSpPr>
         <p:spPr>
@@ -3701,7 +3713,9 @@
               </a:ext>
             </a:extLst>
           </p:cNvPr>
-          <p:cNvGrpSpPr/>
+          <p:cNvGrpSpPr>
+            <a:grpSpLocks noGrp="1" noUngrp="1" noRot="1" noMove="1" noResize="1"/>
+          </p:cNvGrpSpPr>
           <p:nvPr/>
         </p:nvGrpSpPr>
         <p:grpSpPr>
@@ -3721,7 +3735,9 @@
                 </a:ext>
               </a:extLst>
             </p:cNvPr>
-            <p:cNvGrpSpPr/>
+            <p:cNvGrpSpPr>
+              <a:grpSpLocks noGrp="1" noUngrp="1" noRot="1" noMove="1" noResize="1"/>
+            </p:cNvGrpSpPr>
             <p:nvPr/>
           </p:nvGrpSpPr>
           <p:grpSpPr>
@@ -3741,7 +3757,9 @@
                   </a:ext>
                 </a:extLst>
               </p:cNvPr>
-              <p:cNvSpPr/>
+              <p:cNvSpPr>
+                <a:spLocks noGrp="1" noRot="1" noMove="1" noResize="1" noEditPoints="1" noAdjustHandles="1" noChangeArrowheads="1" noChangeShapeType="1"/>
+              </p:cNvSpPr>
               <p:nvPr/>
             </p:nvSpPr>
             <p:spPr>
@@ -3798,7 +3816,9 @@
                   </a:ext>
                 </a:extLst>
               </p:cNvPr>
-              <p:cNvSpPr/>
+              <p:cNvSpPr>
+                <a:spLocks noGrp="1" noRot="1" noMove="1" noResize="1" noEditPoints="1" noAdjustHandles="1" noChangeArrowheads="1" noChangeShapeType="1"/>
+              </p:cNvSpPr>
               <p:nvPr/>
             </p:nvSpPr>
             <p:spPr>
@@ -3858,7 +3878,9 @@
                   </a:ext>
                 </a:extLst>
               </p:cNvPr>
-              <p:cNvSpPr/>
+              <p:cNvSpPr>
+                <a:spLocks noGrp="1" noRot="1" noMove="1" noResize="1" noEditPoints="1" noAdjustHandles="1" noChangeArrowheads="1" noChangeShapeType="1"/>
+              </p:cNvSpPr>
               <p:nvPr/>
             </p:nvSpPr>
             <p:spPr>
@@ -3918,7 +3940,9 @@
                   </a:ext>
                 </a:extLst>
               </p:cNvPr>
-              <p:cNvSpPr/>
+              <p:cNvSpPr>
+                <a:spLocks noGrp="1" noRot="1" noMove="1" noResize="1" noEditPoints="1" noAdjustHandles="1" noChangeArrowheads="1" noChangeShapeType="1"/>
+              </p:cNvSpPr>
               <p:nvPr/>
             </p:nvSpPr>
             <p:spPr>
@@ -3978,7 +4002,9 @@
                   </a:ext>
                 </a:extLst>
               </p:cNvPr>
-              <p:cNvSpPr/>
+              <p:cNvSpPr>
+                <a:spLocks noGrp="1" noRot="1" noMove="1" noResize="1" noEditPoints="1" noAdjustHandles="1" noChangeArrowheads="1" noChangeShapeType="1"/>
+              </p:cNvSpPr>
               <p:nvPr/>
             </p:nvSpPr>
             <p:spPr>
@@ -4038,7 +4064,9 @@
                   </a:ext>
                 </a:extLst>
               </p:cNvPr>
-              <p:cNvSpPr/>
+              <p:cNvSpPr>
+                <a:spLocks noGrp="1" noRot="1" noMove="1" noResize="1" noEditPoints="1" noAdjustHandles="1" noChangeArrowheads="1" noChangeShapeType="1"/>
+              </p:cNvSpPr>
               <p:nvPr/>
             </p:nvSpPr>
             <p:spPr>
@@ -4098,7 +4126,9 @@
                   </a:ext>
                 </a:extLst>
               </p:cNvPr>
-              <p:cNvSpPr/>
+              <p:cNvSpPr>
+                <a:spLocks noGrp="1" noRot="1" noMove="1" noResize="1" noEditPoints="1" noAdjustHandles="1" noChangeArrowheads="1" noChangeShapeType="1"/>
+              </p:cNvSpPr>
               <p:nvPr/>
             </p:nvSpPr>
             <p:spPr>
@@ -4158,7 +4188,9 @@
                   </a:ext>
                 </a:extLst>
               </p:cNvPr>
-              <p:cNvSpPr/>
+              <p:cNvSpPr>
+                <a:spLocks noGrp="1" noRot="1" noMove="1" noResize="1" noEditPoints="1" noAdjustHandles="1" noChangeArrowheads="1" noChangeShapeType="1"/>
+              </p:cNvSpPr>
               <p:nvPr/>
             </p:nvSpPr>
             <p:spPr>
@@ -4220,7 +4252,7 @@
               </a:extLst>
             </p:cNvPr>
             <p:cNvPicPr>
-              <a:picLocks noChangeAspect="1"/>
+              <a:picLocks noGrp="1" noRot="1" noChangeAspect="1" noMove="1" noResize="1" noEditPoints="1" noAdjustHandles="1" noChangeArrowheads="1" noChangeShapeType="1" noCrop="1"/>
             </p:cNvPicPr>
             <p:nvPr/>
           </p:nvPicPr>
@@ -4261,7 +4293,7 @@
               </a:extLst>
             </p:cNvPr>
             <p:cNvPicPr>
-              <a:picLocks noChangeAspect="1"/>
+              <a:picLocks noGrp="1" noRot="1" noChangeAspect="1" noMove="1" noResize="1" noEditPoints="1" noAdjustHandles="1" noChangeArrowheads="1" noChangeShapeType="1" noCrop="1"/>
             </p:cNvPicPr>
             <p:nvPr/>
           </p:nvPicPr>
@@ -4302,7 +4334,9 @@
               </a:ext>
             </a:extLst>
           </p:cNvPr>
-          <p:cNvSpPr/>
+          <p:cNvSpPr>
+            <a:spLocks noGrp="1" noRot="1" noMove="1" noResize="1" noEditPoints="1" noAdjustHandles="1" noChangeArrowheads="1" noChangeShapeType="1"/>
+          </p:cNvSpPr>
           <p:nvPr/>
         </p:nvSpPr>
         <p:spPr>
@@ -4359,7 +4393,9 @@
               </a:ext>
             </a:extLst>
           </p:cNvPr>
-          <p:cNvSpPr/>
+          <p:cNvSpPr>
+            <a:spLocks noGrp="1" noRot="1" noMove="1" noResize="1" noEditPoints="1" noAdjustHandles="1" noChangeArrowheads="1" noChangeShapeType="1"/>
+          </p:cNvSpPr>
           <p:nvPr/>
         </p:nvSpPr>
         <p:spPr>
@@ -4605,7 +4641,9 @@
               </a:ext>
             </a:extLst>
           </p:cNvPr>
-          <p:cNvSpPr/>
+          <p:cNvSpPr>
+            <a:spLocks noGrp="1" noRot="1" noMove="1" noResize="1" noEditPoints="1" noAdjustHandles="1" noChangeArrowheads="1" noChangeShapeType="1"/>
+          </p:cNvSpPr>
           <p:nvPr/>
         </p:nvSpPr>
         <p:spPr>
@@ -4663,7 +4701,9 @@
               </a:ext>
             </a:extLst>
           </p:cNvPr>
-          <p:cNvSpPr/>
+          <p:cNvSpPr>
+            <a:spLocks noGrp="1" noRot="1" noMove="1" noResize="1" noEditPoints="1" noAdjustHandles="1" noChangeArrowheads="1" noChangeShapeType="1"/>
+          </p:cNvSpPr>
           <p:nvPr/>
         </p:nvSpPr>
         <p:spPr>
@@ -5306,7 +5346,9 @@
               </a:ext>
             </a:extLst>
           </p:cNvPr>
-          <p:cNvSpPr txBox="1"/>
+          <p:cNvSpPr txBox="1">
+            <a:spLocks noGrp="1" noRot="1" noMove="1" noResize="1" noEditPoints="1" noAdjustHandles="1" noChangeArrowheads="1" noChangeShapeType="1"/>
+          </p:cNvSpPr>
           <p:nvPr/>
         </p:nvSpPr>
         <p:spPr>
@@ -5339,6 +5381,472 @@
           </a:p>
         </p:txBody>
       </p:sp>
+      <p:sp>
+        <p:nvSpPr>
+          <p:cNvPr id="2" name="Textfeld 1">
+            <a:extLst>
+              <a:ext uri="{FF2B5EF4-FFF2-40B4-BE49-F238E27FC236}">
+                <a16:creationId xmlns:a16="http://schemas.microsoft.com/office/drawing/2014/main" id="{7DAC6C68-1162-5A05-FE75-8DBEFCB8872C}"/>
+              </a:ext>
+            </a:extLst>
+          </p:cNvPr>
+          <p:cNvSpPr txBox="1"/>
+          <p:nvPr/>
+        </p:nvSpPr>
+        <p:spPr>
+          <a:xfrm>
+            <a:off x="1755611" y="1283287"/>
+            <a:ext cx="1710789" cy="307777"/>
+          </a:xfrm>
+          <a:prstGeom prst="rect">
+            <a:avLst/>
+          </a:prstGeom>
+          <a:noFill/>
+        </p:spPr>
+        <p:txBody>
+          <a:bodyPr wrap="none" rtlCol="0">
+            <a:spAutoFit/>
+          </a:bodyPr>
+          <a:lstStyle/>
+          <a:p>
+            <a:r>
+              <a:rPr lang="de-DE" sz="1400" dirty="0"/>
+              <a:t>Zugzielanzeiger Nord</a:t>
+            </a:r>
+          </a:p>
+        </p:txBody>
+      </p:sp>
+      <p:sp>
+        <p:nvSpPr>
+          <p:cNvPr id="3" name="Textfeld 2">
+            <a:extLst>
+              <a:ext uri="{FF2B5EF4-FFF2-40B4-BE49-F238E27FC236}">
+                <a16:creationId xmlns:a16="http://schemas.microsoft.com/office/drawing/2014/main" id="{0C2D3DC5-DA6F-B53C-1CFE-3535E12A0118}"/>
+              </a:ext>
+            </a:extLst>
+          </p:cNvPr>
+          <p:cNvSpPr txBox="1"/>
+          <p:nvPr/>
+        </p:nvSpPr>
+        <p:spPr>
+          <a:xfrm>
+            <a:off x="1822957" y="4430964"/>
+            <a:ext cx="1617046" cy="307777"/>
+          </a:xfrm>
+          <a:prstGeom prst="rect">
+            <a:avLst/>
+          </a:prstGeom>
+          <a:noFill/>
+        </p:spPr>
+        <p:txBody>
+          <a:bodyPr wrap="none" rtlCol="0">
+            <a:spAutoFit/>
+          </a:bodyPr>
+          <a:lstStyle/>
+          <a:p>
+            <a:r>
+              <a:rPr lang="de-DE" sz="1400" dirty="0"/>
+              <a:t>Zugzielanzeiger Süd</a:t>
+            </a:r>
+          </a:p>
+        </p:txBody>
+      </p:sp>
+      <p:sp>
+        <p:nvSpPr>
+          <p:cNvPr id="5" name="Textfeld 4">
+            <a:extLst>
+              <a:ext uri="{FF2B5EF4-FFF2-40B4-BE49-F238E27FC236}">
+                <a16:creationId xmlns:a16="http://schemas.microsoft.com/office/drawing/2014/main" id="{9433BBA2-857A-A2A8-5C72-6386C23B7E96}"/>
+              </a:ext>
+            </a:extLst>
+          </p:cNvPr>
+          <p:cNvSpPr txBox="1"/>
+          <p:nvPr/>
+        </p:nvSpPr>
+        <p:spPr>
+          <a:xfrm>
+            <a:off x="5284354" y="1800300"/>
+            <a:ext cx="1586618" cy="738664"/>
+          </a:xfrm>
+          <a:prstGeom prst="rect">
+            <a:avLst/>
+          </a:prstGeom>
+          <a:noFill/>
+        </p:spPr>
+        <p:txBody>
+          <a:bodyPr wrap="square" rtlCol="0">
+            <a:spAutoFit/>
+          </a:bodyPr>
+          <a:lstStyle/>
+          <a:p>
+            <a:pPr algn="ctr"/>
+            <a:r>
+              <a:rPr lang="de-DE" sz="1400" dirty="0"/>
+              <a:t>Dynamischer Schriftanzeiger (DSA)</a:t>
+            </a:r>
+          </a:p>
+        </p:txBody>
+      </p:sp>
+      <p:pic>
+        <p:nvPicPr>
+          <p:cNvPr id="9" name="Grafik 8" descr="Volumen mit einfarbiger Füllung">
+            <a:extLst>
+              <a:ext uri="{FF2B5EF4-FFF2-40B4-BE49-F238E27FC236}">
+                <a16:creationId xmlns:a16="http://schemas.microsoft.com/office/drawing/2014/main" id="{64A2412A-254D-7929-5169-7AB785C0A956}"/>
+              </a:ext>
+            </a:extLst>
+          </p:cNvPr>
+          <p:cNvPicPr>
+            <a:picLocks noChangeAspect="1"/>
+          </p:cNvPicPr>
+          <p:nvPr/>
+        </p:nvPicPr>
+        <p:blipFill>
+          <a:blip r:embed="rId18">
+            <a:extLst>
+              <a:ext uri="{96DAC541-7B7A-43D3-8B79-37D633B846F1}">
+                <asvg:svgBlip xmlns:asvg="http://schemas.microsoft.com/office/drawing/2016/SVG/main" r:embed="rId19"/>
+              </a:ext>
+            </a:extLst>
+          </a:blip>
+          <a:stretch>
+            <a:fillRect/>
+          </a:stretch>
+        </p:blipFill>
+        <p:spPr>
+          <a:xfrm>
+            <a:off x="608690" y="2050072"/>
+            <a:ext cx="219264" cy="219264"/>
+          </a:xfrm>
+          <a:prstGeom prst="rect">
+            <a:avLst/>
+          </a:prstGeom>
+        </p:spPr>
+      </p:pic>
+      <p:pic>
+        <p:nvPicPr>
+          <p:cNvPr id="10" name="Grafik 9" descr="Volumen mit einfarbiger Füllung">
+            <a:extLst>
+              <a:ext uri="{FF2B5EF4-FFF2-40B4-BE49-F238E27FC236}">
+                <a16:creationId xmlns:a16="http://schemas.microsoft.com/office/drawing/2014/main" id="{5067A5F4-9211-33A7-3460-29D3CE3ECCFB}"/>
+              </a:ext>
+            </a:extLst>
+          </p:cNvPr>
+          <p:cNvPicPr>
+            <a:picLocks noChangeAspect="1"/>
+          </p:cNvPicPr>
+          <p:nvPr/>
+        </p:nvPicPr>
+        <p:blipFill>
+          <a:blip r:embed="rId18">
+            <a:extLst>
+              <a:ext uri="{96DAC541-7B7A-43D3-8B79-37D633B846F1}">
+                <asvg:svgBlip xmlns:asvg="http://schemas.microsoft.com/office/drawing/2016/SVG/main" r:embed="rId19"/>
+              </a:ext>
+            </a:extLst>
+          </a:blip>
+          <a:stretch>
+            <a:fillRect/>
+          </a:stretch>
+        </p:blipFill>
+        <p:spPr>
+          <a:xfrm>
+            <a:off x="2386247" y="2901382"/>
+            <a:ext cx="219264" cy="219264"/>
+          </a:xfrm>
+          <a:prstGeom prst="rect">
+            <a:avLst/>
+          </a:prstGeom>
+        </p:spPr>
+      </p:pic>
+      <p:pic>
+        <p:nvPicPr>
+          <p:cNvPr id="24" name="Grafik 23" descr="Volumen mit einfarbiger Füllung">
+            <a:extLst>
+              <a:ext uri="{FF2B5EF4-FFF2-40B4-BE49-F238E27FC236}">
+                <a16:creationId xmlns:a16="http://schemas.microsoft.com/office/drawing/2014/main" id="{2918AF8B-4F88-0152-0592-9ECDD3FE8CD0}"/>
+              </a:ext>
+            </a:extLst>
+          </p:cNvPr>
+          <p:cNvPicPr>
+            <a:picLocks noChangeAspect="1"/>
+          </p:cNvPicPr>
+          <p:nvPr/>
+        </p:nvPicPr>
+        <p:blipFill>
+          <a:blip r:embed="rId18">
+            <a:extLst>
+              <a:ext uri="{96DAC541-7B7A-43D3-8B79-37D633B846F1}">
+                <asvg:svgBlip xmlns:asvg="http://schemas.microsoft.com/office/drawing/2016/SVG/main" r:embed="rId19"/>
+              </a:ext>
+            </a:extLst>
+          </a:blip>
+          <a:stretch>
+            <a:fillRect/>
+          </a:stretch>
+        </p:blipFill>
+        <p:spPr>
+          <a:xfrm>
+            <a:off x="5432944" y="2970482"/>
+            <a:ext cx="219264" cy="219264"/>
+          </a:xfrm>
+          <a:prstGeom prst="rect">
+            <a:avLst/>
+          </a:prstGeom>
+        </p:spPr>
+      </p:pic>
+      <p:pic>
+        <p:nvPicPr>
+          <p:cNvPr id="26" name="Grafik 25" descr="Volumen mit einfarbiger Füllung">
+            <a:extLst>
+              <a:ext uri="{FF2B5EF4-FFF2-40B4-BE49-F238E27FC236}">
+                <a16:creationId xmlns:a16="http://schemas.microsoft.com/office/drawing/2014/main" id="{05AC6B68-B9C9-55D7-43FE-A0E8666D1F5A}"/>
+              </a:ext>
+            </a:extLst>
+          </p:cNvPr>
+          <p:cNvPicPr>
+            <a:picLocks noChangeAspect="1"/>
+          </p:cNvPicPr>
+          <p:nvPr/>
+        </p:nvPicPr>
+        <p:blipFill>
+          <a:blip r:embed="rId18">
+            <a:extLst>
+              <a:ext uri="{96DAC541-7B7A-43D3-8B79-37D633B846F1}">
+                <asvg:svgBlip xmlns:asvg="http://schemas.microsoft.com/office/drawing/2016/SVG/main" r:embed="rId19"/>
+              </a:ext>
+            </a:extLst>
+          </a:blip>
+          <a:stretch>
+            <a:fillRect/>
+          </a:stretch>
+        </p:blipFill>
+        <p:spPr>
+          <a:xfrm>
+            <a:off x="9543570" y="4425922"/>
+            <a:ext cx="219264" cy="219264"/>
+          </a:xfrm>
+          <a:prstGeom prst="rect">
+            <a:avLst/>
+          </a:prstGeom>
+        </p:spPr>
+      </p:pic>
+      <p:pic>
+        <p:nvPicPr>
+          <p:cNvPr id="28" name="Grafik 27" descr="Volumen mit einfarbiger Füllung">
+            <a:extLst>
+              <a:ext uri="{FF2B5EF4-FFF2-40B4-BE49-F238E27FC236}">
+                <a16:creationId xmlns:a16="http://schemas.microsoft.com/office/drawing/2014/main" id="{E27951B4-7DAF-4DD8-C309-28CA0D28099A}"/>
+              </a:ext>
+            </a:extLst>
+          </p:cNvPr>
+          <p:cNvPicPr>
+            <a:picLocks noChangeAspect="1"/>
+          </p:cNvPicPr>
+          <p:nvPr/>
+        </p:nvPicPr>
+        <p:blipFill>
+          <a:blip r:embed="rId18">
+            <a:extLst>
+              <a:ext uri="{96DAC541-7B7A-43D3-8B79-37D633B846F1}">
+                <asvg:svgBlip xmlns:asvg="http://schemas.microsoft.com/office/drawing/2016/SVG/main" r:embed="rId19"/>
+              </a:ext>
+            </a:extLst>
+          </a:blip>
+          <a:stretch>
+            <a:fillRect/>
+          </a:stretch>
+        </p:blipFill>
+        <p:spPr>
+          <a:xfrm>
+            <a:off x="1872757" y="6002602"/>
+            <a:ext cx="219264" cy="219264"/>
+          </a:xfrm>
+          <a:prstGeom prst="rect">
+            <a:avLst/>
+          </a:prstGeom>
+        </p:spPr>
+      </p:pic>
+      <p:pic>
+        <p:nvPicPr>
+          <p:cNvPr id="29" name="Grafik 28" descr="Volumen mit einfarbiger Füllung">
+            <a:extLst>
+              <a:ext uri="{FF2B5EF4-FFF2-40B4-BE49-F238E27FC236}">
+                <a16:creationId xmlns:a16="http://schemas.microsoft.com/office/drawing/2014/main" id="{6A4DDE69-010C-C7B4-0C4D-B4AAF10356BA}"/>
+              </a:ext>
+            </a:extLst>
+          </p:cNvPr>
+          <p:cNvPicPr>
+            <a:picLocks noChangeAspect="1"/>
+          </p:cNvPicPr>
+          <p:nvPr/>
+        </p:nvPicPr>
+        <p:blipFill>
+          <a:blip r:embed="rId18">
+            <a:extLst>
+              <a:ext uri="{96DAC541-7B7A-43D3-8B79-37D633B846F1}">
+                <asvg:svgBlip xmlns:asvg="http://schemas.microsoft.com/office/drawing/2016/SVG/main" r:embed="rId19"/>
+              </a:ext>
+            </a:extLst>
+          </a:blip>
+          <a:stretch>
+            <a:fillRect/>
+          </a:stretch>
+        </p:blipFill>
+        <p:spPr>
+          <a:xfrm>
+            <a:off x="3440003" y="42517"/>
+            <a:ext cx="219264" cy="219264"/>
+          </a:xfrm>
+          <a:prstGeom prst="rect">
+            <a:avLst/>
+          </a:prstGeom>
+        </p:spPr>
+      </p:pic>
+      <p:pic>
+        <p:nvPicPr>
+          <p:cNvPr id="31" name="Grafik 30" descr="Werbung mit einfarbiger Füllung">
+            <a:extLst>
+              <a:ext uri="{FF2B5EF4-FFF2-40B4-BE49-F238E27FC236}">
+                <a16:creationId xmlns:a16="http://schemas.microsoft.com/office/drawing/2014/main" id="{A013BC9C-3556-679F-5BEE-479166EFDBAB}"/>
+              </a:ext>
+            </a:extLst>
+          </p:cNvPr>
+          <p:cNvPicPr>
+            <a:picLocks noChangeAspect="1"/>
+          </p:cNvPicPr>
+          <p:nvPr/>
+        </p:nvPicPr>
+        <p:blipFill>
+          <a:blip r:embed="rId20">
+            <a:extLst>
+              <a:ext uri="{96DAC541-7B7A-43D3-8B79-37D633B846F1}">
+                <asvg:svgBlip xmlns:asvg="http://schemas.microsoft.com/office/drawing/2016/SVG/main" r:embed="rId21"/>
+              </a:ext>
+            </a:extLst>
+          </a:blip>
+          <a:stretch>
+            <a:fillRect/>
+          </a:stretch>
+        </p:blipFill>
+        <p:spPr>
+          <a:xfrm>
+            <a:off x="1382699" y="2101620"/>
+            <a:ext cx="437344" cy="437344"/>
+          </a:xfrm>
+          <a:prstGeom prst="rect">
+            <a:avLst/>
+          </a:prstGeom>
+        </p:spPr>
+      </p:pic>
+      <p:pic>
+        <p:nvPicPr>
+          <p:cNvPr id="32" name="Grafik 31" descr="Werbung mit einfarbiger Füllung">
+            <a:extLst>
+              <a:ext uri="{FF2B5EF4-FFF2-40B4-BE49-F238E27FC236}">
+                <a16:creationId xmlns:a16="http://schemas.microsoft.com/office/drawing/2014/main" id="{35D18DAC-D633-F347-61F5-268E06E8194D}"/>
+              </a:ext>
+            </a:extLst>
+          </p:cNvPr>
+          <p:cNvPicPr>
+            <a:picLocks noChangeAspect="1"/>
+          </p:cNvPicPr>
+          <p:nvPr/>
+        </p:nvPicPr>
+        <p:blipFill>
+          <a:blip r:embed="rId20">
+            <a:extLst>
+              <a:ext uri="{96DAC541-7B7A-43D3-8B79-37D633B846F1}">
+                <asvg:svgBlip xmlns:asvg="http://schemas.microsoft.com/office/drawing/2016/SVG/main" r:embed="rId21"/>
+              </a:ext>
+            </a:extLst>
+          </a:blip>
+          <a:stretch>
+            <a:fillRect/>
+          </a:stretch>
+        </p:blipFill>
+        <p:spPr>
+          <a:xfrm>
+            <a:off x="9423170" y="4734946"/>
+            <a:ext cx="437344" cy="437344"/>
+          </a:xfrm>
+          <a:prstGeom prst="rect">
+            <a:avLst/>
+          </a:prstGeom>
+        </p:spPr>
+      </p:pic>
+      <p:pic>
+        <p:nvPicPr>
+          <p:cNvPr id="38" name="Grafik 37" descr="Fragen Silhouette">
+            <a:extLst>
+              <a:ext uri="{FF2B5EF4-FFF2-40B4-BE49-F238E27FC236}">
+                <a16:creationId xmlns:a16="http://schemas.microsoft.com/office/drawing/2014/main" id="{98B96699-E917-DFFC-C5D5-75DE979E11BF}"/>
+              </a:ext>
+            </a:extLst>
+          </p:cNvPr>
+          <p:cNvPicPr>
+            <a:picLocks noChangeAspect="1"/>
+          </p:cNvPicPr>
+          <p:nvPr/>
+        </p:nvPicPr>
+        <p:blipFill>
+          <a:blip r:embed="rId22">
+            <a:extLst>
+              <a:ext uri="{96DAC541-7B7A-43D3-8B79-37D633B846F1}">
+                <asvg:svgBlip xmlns:asvg="http://schemas.microsoft.com/office/drawing/2016/SVG/main" r:embed="rId23"/>
+              </a:ext>
+            </a:extLst>
+          </a:blip>
+          <a:stretch>
+            <a:fillRect/>
+          </a:stretch>
+        </p:blipFill>
+        <p:spPr>
+          <a:xfrm>
+            <a:off x="847396" y="2078225"/>
+            <a:ext cx="574354" cy="574354"/>
+          </a:xfrm>
+          <a:prstGeom prst="rect">
+            <a:avLst/>
+          </a:prstGeom>
+        </p:spPr>
+      </p:pic>
+      <p:pic>
+        <p:nvPicPr>
+          <p:cNvPr id="7" name="Grafik 6" descr="Volumen mit einfarbiger Füllung">
+            <a:extLst>
+              <a:ext uri="{FF2B5EF4-FFF2-40B4-BE49-F238E27FC236}">
+                <a16:creationId xmlns:a16="http://schemas.microsoft.com/office/drawing/2014/main" id="{1EFD6611-2E76-E8A5-83CE-2B99D3077B3D}"/>
+              </a:ext>
+            </a:extLst>
+          </p:cNvPr>
+          <p:cNvPicPr>
+            <a:picLocks noChangeAspect="1"/>
+          </p:cNvPicPr>
+          <p:nvPr/>
+        </p:nvPicPr>
+        <p:blipFill>
+          <a:blip r:embed="rId18">
+            <a:extLst>
+              <a:ext uri="{96DAC541-7B7A-43D3-8B79-37D633B846F1}">
+                <asvg:svgBlip xmlns:asvg="http://schemas.microsoft.com/office/drawing/2016/SVG/main" r:embed="rId19"/>
+              </a:ext>
+            </a:extLst>
+          </a:blip>
+          <a:stretch>
+            <a:fillRect/>
+          </a:stretch>
+        </p:blipFill>
+        <p:spPr>
+          <a:xfrm>
+            <a:off x="6291194" y="2288696"/>
+            <a:ext cx="219264" cy="219264"/>
+          </a:xfrm>
+          <a:prstGeom prst="rect">
+            <a:avLst/>
+          </a:prstGeom>
+        </p:spPr>
+      </p:pic>
     </p:spTree>
     <p:extLst>
       <p:ext uri="{BB962C8B-B14F-4D97-AF65-F5344CB8AC3E}">

</xml_diff>